<commit_message>
Add inventory management example
</commit_message>
<xml_diff>
--- a/1 - Apresentações/09 - Distribuições de probabilidades para variáveis aleatórias contínuas.pptx
+++ b/1 - Apresentações/09 - Distribuições de probabilidades para variáveis aleatórias contínuas.pptx
@@ -6,7 +6,7 @@
     <p:sldMasterId id="2147483673" r:id="rId2"/>
   </p:sldMasterIdLst>
   <p:notesMasterIdLst>
-    <p:notesMasterId r:id="rId34"/>
+    <p:notesMasterId r:id="rId35"/>
   </p:notesMasterIdLst>
   <p:sldIdLst>
     <p:sldId id="256" r:id="rId3"/>
@@ -39,7 +39,8 @@
     <p:sldId id="473" r:id="rId30"/>
     <p:sldId id="474" r:id="rId31"/>
     <p:sldId id="472" r:id="rId32"/>
-    <p:sldId id="475" r:id="rId33"/>
+    <p:sldId id="476" r:id="rId33"/>
+    <p:sldId id="475" r:id="rId34"/>
   </p:sldIdLst>
   <p:sldSz cx="12192000" cy="6858000"/>
   <p:notesSz cx="6858000" cy="9144000"/>
@@ -228,7 +229,7 @@
           <a:p>
             <a:fld id="{FAB5EE9D-A04F-413D-B77A-C891F23154A4}" type="datetimeFigureOut">
               <a:rPr lang="en-US" smtClean="0"/>
-              <a:t>6/2/2021</a:t>
+              <a:t>6/6/2021</a:t>
             </a:fld>
             <a:endParaRPr lang="en-US"/>
           </a:p>
@@ -9288,7 +9289,7 @@
           <a:p>
             <a:fld id="{5E7A9C64-4CDD-410A-9115-6C2C5881ED1D}" type="datetimeFigureOut">
               <a:rPr lang="en-US" smtClean="0"/>
-              <a:t>6/2/2021</a:t>
+              <a:t>6/6/2021</a:t>
             </a:fld>
             <a:endParaRPr lang="en-US"/>
           </a:p>
@@ -9495,7 +9496,7 @@
           <a:p>
             <a:fld id="{5E7A9C64-4CDD-410A-9115-6C2C5881ED1D}" type="datetimeFigureOut">
               <a:rPr lang="en-US" smtClean="0"/>
-              <a:t>6/2/2021</a:t>
+              <a:t>6/6/2021</a:t>
             </a:fld>
             <a:endParaRPr lang="en-US"/>
           </a:p>
@@ -9675,7 +9676,7 @@
           <a:p>
             <a:fld id="{5E7A9C64-4CDD-410A-9115-6C2C5881ED1D}" type="datetimeFigureOut">
               <a:rPr lang="en-US" smtClean="0"/>
-              <a:t>6/2/2021</a:t>
+              <a:t>6/6/2021</a:t>
             </a:fld>
             <a:endParaRPr lang="en-US"/>
           </a:p>
@@ -10618,7 +10619,7 @@
               <a:pPr>
                 <a:defRPr/>
               </a:pPr>
-              <a:t>02/06/2021</a:t>
+              <a:t>06/06/2021</a:t>
             </a:fld>
             <a:endParaRPr lang="pt-BR"/>
           </a:p>
@@ -10821,7 +10822,7 @@
           <a:p>
             <a:fld id="{5E7A9C64-4CDD-410A-9115-6C2C5881ED1D}" type="datetimeFigureOut">
               <a:rPr lang="en-US" smtClean="0"/>
-              <a:t>6/2/2021</a:t>
+              <a:t>6/6/2021</a:t>
             </a:fld>
             <a:endParaRPr lang="en-US"/>
           </a:p>
@@ -10964,7 +10965,7 @@
               <a:pPr>
                 <a:defRPr/>
               </a:pPr>
-              <a:t>02/06/2021</a:t>
+              <a:t>06/06/2021</a:t>
             </a:fld>
             <a:endParaRPr lang="pt-BR"/>
           </a:p>
@@ -11168,7 +11169,7 @@
             <a:fld id="{3D42CDA9-213D-4C02-980C-42BE0089B4E4}" type="datetimeFigureOut">
               <a:rPr lang="pt-BR" smtClean="0"/>
               <a:pPr/>
-              <a:t>02/06/2021</a:t>
+              <a:t>06/06/2021</a:t>
             </a:fld>
             <a:endParaRPr lang="pt-BR"/>
           </a:p>
@@ -20067,7 +20068,7 @@
           <a:p>
             <a:fld id="{5E7A9C64-4CDD-410A-9115-6C2C5881ED1D}" type="datetimeFigureOut">
               <a:rPr lang="en-US" smtClean="0"/>
-              <a:t>6/2/2021</a:t>
+              <a:t>6/6/2021</a:t>
             </a:fld>
             <a:endParaRPr lang="en-US"/>
           </a:p>
@@ -20341,7 +20342,7 @@
           <a:p>
             <a:fld id="{5E7A9C64-4CDD-410A-9115-6C2C5881ED1D}" type="datetimeFigureOut">
               <a:rPr lang="en-US" smtClean="0"/>
-              <a:t>6/2/2021</a:t>
+              <a:t>6/6/2021</a:t>
             </a:fld>
             <a:endParaRPr lang="en-US"/>
           </a:p>
@@ -20739,7 +20740,7 @@
           <a:p>
             <a:fld id="{5E7A9C64-4CDD-410A-9115-6C2C5881ED1D}" type="datetimeFigureOut">
               <a:rPr lang="en-US" smtClean="0"/>
-              <a:t>6/2/2021</a:t>
+              <a:t>6/6/2021</a:t>
             </a:fld>
             <a:endParaRPr lang="en-US"/>
           </a:p>
@@ -20857,7 +20858,7 @@
           <a:p>
             <a:fld id="{5E7A9C64-4CDD-410A-9115-6C2C5881ED1D}" type="datetimeFigureOut">
               <a:rPr lang="en-US" smtClean="0"/>
-              <a:t>6/2/2021</a:t>
+              <a:t>6/6/2021</a:t>
             </a:fld>
             <a:endParaRPr lang="en-US"/>
           </a:p>
@@ -20952,7 +20953,7 @@
           <a:p>
             <a:fld id="{5E7A9C64-4CDD-410A-9115-6C2C5881ED1D}" type="datetimeFigureOut">
               <a:rPr lang="en-US" smtClean="0"/>
-              <a:t>6/2/2021</a:t>
+              <a:t>6/6/2021</a:t>
             </a:fld>
             <a:endParaRPr lang="en-US"/>
           </a:p>
@@ -21242,7 +21243,7 @@
           <a:p>
             <a:fld id="{5E7A9C64-4CDD-410A-9115-6C2C5881ED1D}" type="datetimeFigureOut">
               <a:rPr lang="en-US" smtClean="0"/>
-              <a:t>6/2/2021</a:t>
+              <a:t>6/6/2021</a:t>
             </a:fld>
             <a:endParaRPr lang="en-US"/>
           </a:p>
@@ -21522,7 +21523,7 @@
           <a:p>
             <a:fld id="{5E7A9C64-4CDD-410A-9115-6C2C5881ED1D}" type="datetimeFigureOut">
               <a:rPr lang="en-US" smtClean="0"/>
-              <a:t>6/2/2021</a:t>
+              <a:t>6/6/2021</a:t>
             </a:fld>
             <a:endParaRPr lang="en-US"/>
           </a:p>
@@ -21772,7 +21773,7 @@
           <a:p>
             <a:fld id="{5E7A9C64-4CDD-410A-9115-6C2C5881ED1D}" type="datetimeFigureOut">
               <a:rPr lang="en-US" smtClean="0"/>
-              <a:t>6/2/2021</a:t>
+              <a:t>6/6/2021</a:t>
             </a:fld>
             <a:endParaRPr lang="en-US"/>
           </a:p>
@@ -30743,8 +30744,8 @@
           </a:p>
         </p:txBody>
       </p:sp>
-      <mc:AlternateContent xmlns:mc="http://schemas.openxmlformats.org/markup-compatibility/2006">
-        <mc:Choice xmlns:a14="http://schemas.microsoft.com/office/drawing/2010/main" Requires="a14">
+      <mc:AlternateContent xmlns:mc="http://schemas.openxmlformats.org/markup-compatibility/2006" xmlns:a14="http://schemas.microsoft.com/office/drawing/2010/main">
+        <mc:Choice Requires="a14">
           <p:sp>
             <p:nvSpPr>
               <p:cNvPr id="5" name="TextBox 4">
@@ -31061,7 +31062,7 @@
             </p:txBody>
           </p:sp>
         </mc:Choice>
-        <mc:Fallback>
+        <mc:Fallback xmlns="">
           <p:sp>
             <p:nvSpPr>
               <p:cNvPr id="5" name="TextBox 4">
@@ -32375,6 +32376,973 @@
 </file>
 
 <file path=ppt/slides/slide31.xml><?xml version="1.0" encoding="utf-8"?>
+<p:sld xmlns:a="http://schemas.openxmlformats.org/drawingml/2006/main" xmlns:r="http://schemas.openxmlformats.org/officeDocument/2006/relationships" xmlns:p="http://schemas.openxmlformats.org/presentationml/2006/main">
+  <p:cSld>
+    <p:spTree>
+      <p:nvGrpSpPr>
+        <p:cNvPr id="1" name=""/>
+        <p:cNvGrpSpPr/>
+        <p:nvPr/>
+      </p:nvGrpSpPr>
+      <p:grpSpPr>
+        <a:xfrm>
+          <a:off x="0" y="0"/>
+          <a:ext cx="0" cy="0"/>
+          <a:chOff x="0" y="0"/>
+          <a:chExt cx="0" cy="0"/>
+        </a:xfrm>
+      </p:grpSpPr>
+      <p:sp>
+        <p:nvSpPr>
+          <p:cNvPr id="2" name="Title 1">
+            <a:extLst>
+              <a:ext uri="{FF2B5EF4-FFF2-40B4-BE49-F238E27FC236}">
+                <a16:creationId xmlns:a16="http://schemas.microsoft.com/office/drawing/2014/main" id="{29F6CCB9-211A-4823-9778-51D63797D7BF}"/>
+              </a:ext>
+            </a:extLst>
+          </p:cNvPr>
+          <p:cNvSpPr>
+            <a:spLocks noGrp="1"/>
+          </p:cNvSpPr>
+          <p:nvPr>
+            <p:ph type="title"/>
+          </p:nvPr>
+        </p:nvSpPr>
+        <p:spPr/>
+        <p:txBody>
+          <a:bodyPr/>
+          <a:lstStyle/>
+          <a:p>
+            <a:r>
+              <a:rPr lang="pt-BR" dirty="0"/>
+              <a:t>Aplicação: Estoque de segurança</a:t>
+            </a:r>
+            <a:endParaRPr lang="en-US" dirty="0"/>
+          </a:p>
+        </p:txBody>
+      </p:sp>
+      <mc:AlternateContent xmlns:mc="http://schemas.openxmlformats.org/markup-compatibility/2006">
+        <mc:Choice xmlns:a14="http://schemas.microsoft.com/office/drawing/2010/main" Requires="a14">
+          <p:sp>
+            <p:nvSpPr>
+              <p:cNvPr id="5" name="Content Placeholder 4">
+                <a:extLst>
+                  <a:ext uri="{FF2B5EF4-FFF2-40B4-BE49-F238E27FC236}">
+                    <a16:creationId xmlns:a16="http://schemas.microsoft.com/office/drawing/2014/main" id="{9D48A1B6-4C2B-45F2-9CD1-4B6816EFD7A2}"/>
+                  </a:ext>
+                </a:extLst>
+              </p:cNvPr>
+              <p:cNvSpPr>
+                <a:spLocks noGrp="1"/>
+              </p:cNvSpPr>
+              <p:nvPr>
+                <p:ph sz="half" idx="2"/>
+              </p:nvPr>
+            </p:nvSpPr>
+            <p:spPr>
+              <a:xfrm>
+                <a:off x="5989319" y="2286000"/>
+                <a:ext cx="6202681" cy="4267200"/>
+              </a:xfrm>
+            </p:spPr>
+            <p:txBody>
+              <a:bodyPr>
+                <a:normAutofit fontScale="62500" lnSpcReduction="20000"/>
+              </a:bodyPr>
+              <a:lstStyle/>
+              <a:p>
+                <a14:m>
+                  <m:oMath xmlns:m="http://schemas.openxmlformats.org/officeDocument/2006/math">
+                    <m:sSub>
+                      <m:sSubPr>
+                        <m:ctrlPr>
+                          <a:rPr lang="en-US" b="0" i="1" smtClean="0">
+                            <a:latin typeface="Cambria Math" panose="02040503050406030204" pitchFamily="18" charset="0"/>
+                          </a:rPr>
+                        </m:ctrlPr>
+                      </m:sSubPr>
+                      <m:e>
+                        <m:r>
+                          <a:rPr lang="pt-BR" b="0" i="1" smtClean="0">
+                            <a:latin typeface="Cambria Math" panose="02040503050406030204" pitchFamily="18" charset="0"/>
+                          </a:rPr>
+                          <m:t>𝐷</m:t>
+                        </m:r>
+                      </m:e>
+                      <m:sub>
+                        <m:r>
+                          <a:rPr lang="en-US" b="0" i="1" smtClean="0">
+                            <a:latin typeface="Cambria Math" panose="02040503050406030204" pitchFamily="18" charset="0"/>
+                          </a:rPr>
+                          <m:t>1</m:t>
+                        </m:r>
+                      </m:sub>
+                    </m:sSub>
+                    <m:r>
+                      <a:rPr lang="pt-BR" b="0" i="1" smtClean="0">
+                        <a:latin typeface="Cambria Math" panose="02040503050406030204" pitchFamily="18" charset="0"/>
+                      </a:rPr>
+                      <m:t>~</m:t>
+                    </m:r>
+                    <m:r>
+                      <a:rPr lang="pt-BR" b="0" i="1" smtClean="0">
+                        <a:latin typeface="Cambria Math" panose="02040503050406030204" pitchFamily="18" charset="0"/>
+                      </a:rPr>
+                      <m:t>𝑁</m:t>
+                    </m:r>
+                    <m:d>
+                      <m:dPr>
+                        <m:ctrlPr>
+                          <a:rPr lang="pt-BR" b="0" i="1" smtClean="0">
+                            <a:latin typeface="Cambria Math" panose="02040503050406030204" pitchFamily="18" charset="0"/>
+                          </a:rPr>
+                        </m:ctrlPr>
+                      </m:dPr>
+                      <m:e>
+                        <m:f>
+                          <m:fPr>
+                            <m:ctrlPr>
+                              <a:rPr lang="en-US" b="0" i="1" smtClean="0">
+                                <a:latin typeface="Cambria Math" panose="02040503050406030204" pitchFamily="18" charset="0"/>
+                              </a:rPr>
+                            </m:ctrlPr>
+                          </m:fPr>
+                          <m:num>
+                            <m:r>
+                              <a:rPr lang="en-US" b="0" i="1" smtClean="0">
+                                <a:latin typeface="Cambria Math" panose="02040503050406030204" pitchFamily="18" charset="0"/>
+                              </a:rPr>
+                              <m:t>𝑄</m:t>
+                            </m:r>
+                          </m:num>
+                          <m:den>
+                            <m:r>
+                              <a:rPr lang="en-US" b="0" i="1" smtClean="0">
+                                <a:latin typeface="Cambria Math" panose="02040503050406030204" pitchFamily="18" charset="0"/>
+                              </a:rPr>
+                              <m:t>𝑇</m:t>
+                            </m:r>
+                          </m:den>
+                        </m:f>
+                        <m:r>
+                          <a:rPr lang="en-US" b="0" i="1" smtClean="0">
+                            <a:latin typeface="Cambria Math" panose="02040503050406030204" pitchFamily="18" charset="0"/>
+                          </a:rPr>
+                          <m:t>;</m:t>
+                        </m:r>
+                        <m:sSup>
+                          <m:sSupPr>
+                            <m:ctrlPr>
+                              <a:rPr lang="en-US" b="0" i="1" smtClean="0">
+                                <a:latin typeface="Cambria Math" panose="02040503050406030204" pitchFamily="18" charset="0"/>
+                              </a:rPr>
+                            </m:ctrlPr>
+                          </m:sSupPr>
+                          <m:e>
+                            <m:r>
+                              <a:rPr lang="en-US" b="0" i="1" smtClean="0">
+                                <a:latin typeface="Cambria Math" panose="02040503050406030204" pitchFamily="18" charset="0"/>
+                              </a:rPr>
+                              <m:t>𝜎</m:t>
+                            </m:r>
+                          </m:e>
+                          <m:sup>
+                            <m:r>
+                              <a:rPr lang="en-US" b="0" i="1" smtClean="0">
+                                <a:latin typeface="Cambria Math" panose="02040503050406030204" pitchFamily="18" charset="0"/>
+                              </a:rPr>
+                              <m:t>2</m:t>
+                            </m:r>
+                          </m:sup>
+                        </m:sSup>
+                      </m:e>
+                    </m:d>
+                  </m:oMath>
+                </a14:m>
+                <a:endParaRPr lang="en-US" dirty="0"/>
+              </a:p>
+              <a:p>
+                <a14:m>
+                  <m:oMath xmlns:m="http://schemas.openxmlformats.org/officeDocument/2006/math">
+                    <m:sSub>
+                      <m:sSubPr>
+                        <m:ctrlPr>
+                          <a:rPr lang="en-US" b="0" i="1" smtClean="0">
+                            <a:latin typeface="Cambria Math" panose="02040503050406030204" pitchFamily="18" charset="0"/>
+                          </a:rPr>
+                        </m:ctrlPr>
+                      </m:sSubPr>
+                      <m:e>
+                        <m:r>
+                          <a:rPr lang="en-US" b="0" i="1" smtClean="0">
+                            <a:latin typeface="Cambria Math" panose="02040503050406030204" pitchFamily="18" charset="0"/>
+                          </a:rPr>
+                          <m:t>𝐷</m:t>
+                        </m:r>
+                      </m:e>
+                      <m:sub>
+                        <m:r>
+                          <a:rPr lang="en-US" b="0" i="1" smtClean="0">
+                            <a:latin typeface="Cambria Math" panose="02040503050406030204" pitchFamily="18" charset="0"/>
+                          </a:rPr>
+                          <m:t>𝐿𝑇</m:t>
+                        </m:r>
+                      </m:sub>
+                    </m:sSub>
+                    <m:r>
+                      <a:rPr lang="en-US" b="0" i="1" smtClean="0">
+                        <a:latin typeface="Cambria Math" panose="02040503050406030204" pitchFamily="18" charset="0"/>
+                      </a:rPr>
+                      <m:t>~</m:t>
+                    </m:r>
+                    <m:r>
+                      <a:rPr lang="en-US" b="0" i="1" smtClean="0">
+                        <a:latin typeface="Cambria Math" panose="02040503050406030204" pitchFamily="18" charset="0"/>
+                      </a:rPr>
+                      <m:t>𝑁</m:t>
+                    </m:r>
+                    <m:d>
+                      <m:dPr>
+                        <m:ctrlPr>
+                          <a:rPr lang="en-US" b="0" i="1" smtClean="0">
+                            <a:latin typeface="Cambria Math" panose="02040503050406030204" pitchFamily="18" charset="0"/>
+                          </a:rPr>
+                        </m:ctrlPr>
+                      </m:dPr>
+                      <m:e>
+                        <m:f>
+                          <m:fPr>
+                            <m:ctrlPr>
+                              <a:rPr lang="en-US" b="0" i="1" smtClean="0">
+                                <a:latin typeface="Cambria Math" panose="02040503050406030204" pitchFamily="18" charset="0"/>
+                              </a:rPr>
+                            </m:ctrlPr>
+                          </m:fPr>
+                          <m:num>
+                            <m:r>
+                              <a:rPr lang="en-US" b="0" i="1" smtClean="0">
+                                <a:latin typeface="Cambria Math" panose="02040503050406030204" pitchFamily="18" charset="0"/>
+                              </a:rPr>
+                              <m:t>𝑄</m:t>
+                            </m:r>
+                          </m:num>
+                          <m:den>
+                            <m:r>
+                              <a:rPr lang="en-US" b="0" i="1" smtClean="0">
+                                <a:latin typeface="Cambria Math" panose="02040503050406030204" pitchFamily="18" charset="0"/>
+                              </a:rPr>
+                              <m:t>𝑇</m:t>
+                            </m:r>
+                          </m:den>
+                        </m:f>
+                        <m:r>
+                          <a:rPr lang="en-US" b="0" i="1" smtClean="0">
+                            <a:latin typeface="Cambria Math" panose="02040503050406030204" pitchFamily="18" charset="0"/>
+                          </a:rPr>
+                          <m:t>𝐿𝑇</m:t>
+                        </m:r>
+                        <m:r>
+                          <a:rPr lang="en-US" b="0" i="1" smtClean="0">
+                            <a:latin typeface="Cambria Math" panose="02040503050406030204" pitchFamily="18" charset="0"/>
+                          </a:rPr>
+                          <m:t>;</m:t>
+                        </m:r>
+                        <m:sSup>
+                          <m:sSupPr>
+                            <m:ctrlPr>
+                              <a:rPr lang="en-US" b="0" i="1" smtClean="0">
+                                <a:latin typeface="Cambria Math" panose="02040503050406030204" pitchFamily="18" charset="0"/>
+                              </a:rPr>
+                            </m:ctrlPr>
+                          </m:sSupPr>
+                          <m:e>
+                            <m:r>
+                              <a:rPr lang="en-US" b="0" i="1" smtClean="0">
+                                <a:latin typeface="Cambria Math" panose="02040503050406030204" pitchFamily="18" charset="0"/>
+                              </a:rPr>
+                              <m:t>𝜎</m:t>
+                            </m:r>
+                          </m:e>
+                          <m:sup>
+                            <m:r>
+                              <a:rPr lang="en-US" b="0" i="1" smtClean="0">
+                                <a:latin typeface="Cambria Math" panose="02040503050406030204" pitchFamily="18" charset="0"/>
+                              </a:rPr>
+                              <m:t>2</m:t>
+                            </m:r>
+                          </m:sup>
+                        </m:sSup>
+                        <m:r>
+                          <a:rPr lang="en-US" b="0" i="1" smtClean="0">
+                            <a:latin typeface="Cambria Math" panose="02040503050406030204" pitchFamily="18" charset="0"/>
+                          </a:rPr>
+                          <m:t>𝐿𝑇</m:t>
+                        </m:r>
+                      </m:e>
+                    </m:d>
+                  </m:oMath>
+                </a14:m>
+                <a:endParaRPr lang="en-US" b="0" dirty="0"/>
+              </a:p>
+              <a:p>
+                <a14:m>
+                  <m:oMath xmlns:m="http://schemas.openxmlformats.org/officeDocument/2006/math">
+                    <m:r>
+                      <a:rPr lang="en-US" b="0" i="1" smtClean="0">
+                        <a:latin typeface="Cambria Math" panose="02040503050406030204" pitchFamily="18" charset="0"/>
+                      </a:rPr>
+                      <m:t>𝑃</m:t>
+                    </m:r>
+                    <m:d>
+                      <m:dPr>
+                        <m:ctrlPr>
+                          <a:rPr lang="en-US" b="0" i="1" smtClean="0">
+                            <a:latin typeface="Cambria Math" panose="02040503050406030204" pitchFamily="18" charset="0"/>
+                          </a:rPr>
+                        </m:ctrlPr>
+                      </m:dPr>
+                      <m:e>
+                        <m:sSub>
+                          <m:sSubPr>
+                            <m:ctrlPr>
+                              <a:rPr lang="en-US" b="0" i="1" smtClean="0">
+                                <a:latin typeface="Cambria Math" panose="02040503050406030204" pitchFamily="18" charset="0"/>
+                              </a:rPr>
+                            </m:ctrlPr>
+                          </m:sSubPr>
+                          <m:e>
+                            <m:r>
+                              <a:rPr lang="en-US" b="0" i="1" smtClean="0">
+                                <a:latin typeface="Cambria Math" panose="02040503050406030204" pitchFamily="18" charset="0"/>
+                              </a:rPr>
+                              <m:t>𝐷</m:t>
+                            </m:r>
+                          </m:e>
+                          <m:sub>
+                            <m:r>
+                              <a:rPr lang="en-US" b="0" i="1" smtClean="0">
+                                <a:latin typeface="Cambria Math" panose="02040503050406030204" pitchFamily="18" charset="0"/>
+                              </a:rPr>
+                              <m:t>𝐿𝑇</m:t>
+                            </m:r>
+                          </m:sub>
+                        </m:sSub>
+                        <m:r>
+                          <a:rPr lang="en-US" b="0" i="1" smtClean="0">
+                            <a:latin typeface="Cambria Math" panose="02040503050406030204" pitchFamily="18" charset="0"/>
+                          </a:rPr>
+                          <m:t>&gt;</m:t>
+                        </m:r>
+                        <m:f>
+                          <m:fPr>
+                            <m:ctrlPr>
+                              <a:rPr lang="en-US" b="0" i="1" smtClean="0">
+                                <a:latin typeface="Cambria Math" panose="02040503050406030204" pitchFamily="18" charset="0"/>
+                              </a:rPr>
+                            </m:ctrlPr>
+                          </m:fPr>
+                          <m:num>
+                            <m:r>
+                              <a:rPr lang="en-US" b="0" i="1" smtClean="0">
+                                <a:latin typeface="Cambria Math" panose="02040503050406030204" pitchFamily="18" charset="0"/>
+                              </a:rPr>
+                              <m:t>𝑄</m:t>
+                            </m:r>
+                          </m:num>
+                          <m:den>
+                            <m:r>
+                              <a:rPr lang="en-US" b="0" i="1" smtClean="0">
+                                <a:latin typeface="Cambria Math" panose="02040503050406030204" pitchFamily="18" charset="0"/>
+                              </a:rPr>
+                              <m:t>𝑇</m:t>
+                            </m:r>
+                          </m:den>
+                        </m:f>
+                        <m:r>
+                          <a:rPr lang="en-US" b="0" i="1" smtClean="0">
+                            <a:latin typeface="Cambria Math" panose="02040503050406030204" pitchFamily="18" charset="0"/>
+                          </a:rPr>
+                          <m:t>𝐿𝑇</m:t>
+                        </m:r>
+                        <m:r>
+                          <a:rPr lang="en-US" b="0" i="1" smtClean="0">
+                            <a:latin typeface="Cambria Math" panose="02040503050406030204" pitchFamily="18" charset="0"/>
+                          </a:rPr>
+                          <m:t>+</m:t>
+                        </m:r>
+                        <m:r>
+                          <a:rPr lang="en-US" b="0" i="1" smtClean="0">
+                            <a:latin typeface="Cambria Math" panose="02040503050406030204" pitchFamily="18" charset="0"/>
+                          </a:rPr>
+                          <m:t>𝑠</m:t>
+                        </m:r>
+                      </m:e>
+                    </m:d>
+                    <m:r>
+                      <a:rPr lang="en-US" b="0" i="1" smtClean="0">
+                        <a:latin typeface="Cambria Math" panose="02040503050406030204" pitchFamily="18" charset="0"/>
+                      </a:rPr>
+                      <m:t>=</m:t>
+                    </m:r>
+                    <m:r>
+                      <a:rPr lang="en-US" b="0" i="1" smtClean="0">
+                        <a:latin typeface="Cambria Math" panose="02040503050406030204" pitchFamily="18" charset="0"/>
+                      </a:rPr>
+                      <m:t>𝛼</m:t>
+                    </m:r>
+                  </m:oMath>
+                </a14:m>
+                <a:endParaRPr lang="en-US" dirty="0"/>
+              </a:p>
+              <a:p>
+                <a:r>
+                  <a:rPr lang="en-US" b="0" dirty="0"/>
+                  <a:t>Logo,</a:t>
+                </a:r>
+              </a:p>
+              <a:p>
+                <a14:m>
+                  <m:oMath xmlns:m="http://schemas.openxmlformats.org/officeDocument/2006/math">
+                    <m:r>
+                      <a:rPr lang="en-US" b="0" i="1" smtClean="0">
+                        <a:latin typeface="Cambria Math" panose="02040503050406030204" pitchFamily="18" charset="0"/>
+                      </a:rPr>
+                      <m:t>𝑃</m:t>
+                    </m:r>
+                    <m:d>
+                      <m:dPr>
+                        <m:ctrlPr>
+                          <a:rPr lang="en-US" b="0" i="1" smtClean="0">
+                            <a:latin typeface="Cambria Math" panose="02040503050406030204" pitchFamily="18" charset="0"/>
+                          </a:rPr>
+                        </m:ctrlPr>
+                      </m:dPr>
+                      <m:e>
+                        <m:sSub>
+                          <m:sSubPr>
+                            <m:ctrlPr>
+                              <a:rPr lang="en-US" b="0" i="1" smtClean="0">
+                                <a:latin typeface="Cambria Math" panose="02040503050406030204" pitchFamily="18" charset="0"/>
+                              </a:rPr>
+                            </m:ctrlPr>
+                          </m:sSubPr>
+                          <m:e>
+                            <m:r>
+                              <a:rPr lang="en-US" b="0" i="1" smtClean="0">
+                                <a:latin typeface="Cambria Math" panose="02040503050406030204" pitchFamily="18" charset="0"/>
+                              </a:rPr>
+                              <m:t>𝐷</m:t>
+                            </m:r>
+                          </m:e>
+                          <m:sub>
+                            <m:r>
+                              <a:rPr lang="en-US" b="0" i="1" smtClean="0">
+                                <a:latin typeface="Cambria Math" panose="02040503050406030204" pitchFamily="18" charset="0"/>
+                              </a:rPr>
+                              <m:t>𝐿𝑇</m:t>
+                            </m:r>
+                          </m:sub>
+                        </m:sSub>
+                        <m:r>
+                          <a:rPr lang="en-US" b="0" i="1" smtClean="0">
+                            <a:latin typeface="Cambria Math" panose="02040503050406030204" pitchFamily="18" charset="0"/>
+                          </a:rPr>
+                          <m:t>&lt;</m:t>
+                        </m:r>
+                        <m:f>
+                          <m:fPr>
+                            <m:ctrlPr>
+                              <a:rPr lang="en-US" b="0" i="1" smtClean="0">
+                                <a:latin typeface="Cambria Math" panose="02040503050406030204" pitchFamily="18" charset="0"/>
+                              </a:rPr>
+                            </m:ctrlPr>
+                          </m:fPr>
+                          <m:num>
+                            <m:r>
+                              <a:rPr lang="en-US" b="0" i="1" smtClean="0">
+                                <a:latin typeface="Cambria Math" panose="02040503050406030204" pitchFamily="18" charset="0"/>
+                              </a:rPr>
+                              <m:t>𝑄</m:t>
+                            </m:r>
+                          </m:num>
+                          <m:den>
+                            <m:r>
+                              <a:rPr lang="en-US" b="0" i="1" smtClean="0">
+                                <a:latin typeface="Cambria Math" panose="02040503050406030204" pitchFamily="18" charset="0"/>
+                              </a:rPr>
+                              <m:t>𝑇</m:t>
+                            </m:r>
+                          </m:den>
+                        </m:f>
+                        <m:r>
+                          <a:rPr lang="en-US" b="0" i="1" smtClean="0">
+                            <a:latin typeface="Cambria Math" panose="02040503050406030204" pitchFamily="18" charset="0"/>
+                          </a:rPr>
+                          <m:t>𝐿𝑇</m:t>
+                        </m:r>
+                        <m:r>
+                          <a:rPr lang="en-US" b="0" i="1" smtClean="0">
+                            <a:latin typeface="Cambria Math" panose="02040503050406030204" pitchFamily="18" charset="0"/>
+                          </a:rPr>
+                          <m:t>+</m:t>
+                        </m:r>
+                        <m:r>
+                          <a:rPr lang="en-US" b="0" i="1" smtClean="0">
+                            <a:latin typeface="Cambria Math" panose="02040503050406030204" pitchFamily="18" charset="0"/>
+                          </a:rPr>
+                          <m:t>𝑠</m:t>
+                        </m:r>
+                      </m:e>
+                    </m:d>
+                    <m:r>
+                      <a:rPr lang="en-US" b="0" i="1" smtClean="0">
+                        <a:latin typeface="Cambria Math" panose="02040503050406030204" pitchFamily="18" charset="0"/>
+                      </a:rPr>
+                      <m:t>=</m:t>
+                    </m:r>
+                    <m:r>
+                      <a:rPr lang="en-US" b="0" i="1" smtClean="0">
+                        <a:latin typeface="Cambria Math" panose="02040503050406030204" pitchFamily="18" charset="0"/>
+                      </a:rPr>
+                      <m:t>1−</m:t>
+                    </m:r>
+                    <m:r>
+                      <a:rPr lang="en-US" b="0" i="1" smtClean="0">
+                        <a:latin typeface="Cambria Math" panose="02040503050406030204" pitchFamily="18" charset="0"/>
+                      </a:rPr>
+                      <m:t>𝛼</m:t>
+                    </m:r>
+                  </m:oMath>
+                </a14:m>
+                <a:endParaRPr lang="en-US" b="0" dirty="0"/>
+              </a:p>
+              <a:p>
+                <a14:m>
+                  <m:oMath xmlns:m="http://schemas.openxmlformats.org/officeDocument/2006/math">
+                    <m:r>
+                      <a:rPr lang="en-US" i="1">
+                        <a:latin typeface="Cambria Math" panose="02040503050406030204" pitchFamily="18" charset="0"/>
+                      </a:rPr>
+                      <m:t>𝑃</m:t>
+                    </m:r>
+                    <m:d>
+                      <m:dPr>
+                        <m:ctrlPr>
+                          <a:rPr lang="en-US" b="0" i="1" smtClean="0">
+                            <a:latin typeface="Cambria Math" panose="02040503050406030204" pitchFamily="18" charset="0"/>
+                          </a:rPr>
+                        </m:ctrlPr>
+                      </m:dPr>
+                      <m:e>
+                        <m:r>
+                          <a:rPr lang="en-US" b="0" i="1" smtClean="0">
+                            <a:latin typeface="Cambria Math" panose="02040503050406030204" pitchFamily="18" charset="0"/>
+                          </a:rPr>
+                          <m:t>𝑍</m:t>
+                        </m:r>
+                        <m:r>
+                          <a:rPr lang="en-US" b="0" i="1" smtClean="0">
+                            <a:latin typeface="Cambria Math" panose="02040503050406030204" pitchFamily="18" charset="0"/>
+                          </a:rPr>
+                          <m:t>&lt;</m:t>
+                        </m:r>
+                        <m:r>
+                          <a:rPr lang="en-US" i="1">
+                            <a:latin typeface="Cambria Math" panose="02040503050406030204" pitchFamily="18" charset="0"/>
+                          </a:rPr>
+                          <m:t>𝑠</m:t>
+                        </m:r>
+                        <m:r>
+                          <a:rPr lang="en-US" b="0" i="1" smtClean="0">
+                            <a:latin typeface="Cambria Math" panose="02040503050406030204" pitchFamily="18" charset="0"/>
+                          </a:rPr>
+                          <m:t>/</m:t>
+                        </m:r>
+                        <m:r>
+                          <a:rPr lang="en-US" b="0" i="1" smtClean="0">
+                            <a:latin typeface="Cambria Math" panose="02040503050406030204" pitchFamily="18" charset="0"/>
+                          </a:rPr>
+                          <m:t>𝜎</m:t>
+                        </m:r>
+                        <m:rad>
+                          <m:radPr>
+                            <m:degHide m:val="on"/>
+                            <m:ctrlPr>
+                              <a:rPr lang="en-US" b="0" i="1" smtClean="0">
+                                <a:latin typeface="Cambria Math" panose="02040503050406030204" pitchFamily="18" charset="0"/>
+                              </a:rPr>
+                            </m:ctrlPr>
+                          </m:radPr>
+                          <m:deg/>
+                          <m:e>
+                            <m:r>
+                              <a:rPr lang="en-US" b="0" i="1" smtClean="0">
+                                <a:latin typeface="Cambria Math" panose="02040503050406030204" pitchFamily="18" charset="0"/>
+                              </a:rPr>
+                              <m:t>𝐿𝑇</m:t>
+                            </m:r>
+                          </m:e>
+                        </m:rad>
+                      </m:e>
+                    </m:d>
+                    <m:r>
+                      <a:rPr lang="en-US" b="0" i="1" smtClean="0">
+                        <a:latin typeface="Cambria Math" panose="02040503050406030204" pitchFamily="18" charset="0"/>
+                      </a:rPr>
+                      <m:t>=1−</m:t>
+                    </m:r>
+                    <m:r>
+                      <a:rPr lang="en-US" b="0" i="1" smtClean="0">
+                        <a:latin typeface="Cambria Math" panose="02040503050406030204" pitchFamily="18" charset="0"/>
+                      </a:rPr>
+                      <m:t>𝛼</m:t>
+                    </m:r>
+                  </m:oMath>
+                </a14:m>
+                <a:endParaRPr lang="en-US" dirty="0"/>
+              </a:p>
+              <a:p>
+                <a14:m>
+                  <m:oMath xmlns:m="http://schemas.openxmlformats.org/officeDocument/2006/math">
+                    <m:f>
+                      <m:fPr>
+                        <m:ctrlPr>
+                          <a:rPr lang="en-US" b="0" i="1" smtClean="0">
+                            <a:latin typeface="Cambria Math" panose="02040503050406030204" pitchFamily="18" charset="0"/>
+                          </a:rPr>
+                        </m:ctrlPr>
+                      </m:fPr>
+                      <m:num>
+                        <m:r>
+                          <a:rPr lang="en-US" b="0" i="1" smtClean="0">
+                            <a:latin typeface="Cambria Math" panose="02040503050406030204" pitchFamily="18" charset="0"/>
+                          </a:rPr>
+                          <m:t>𝑠</m:t>
+                        </m:r>
+                      </m:num>
+                      <m:den>
+                        <m:r>
+                          <a:rPr lang="en-US" b="0" i="1" smtClean="0">
+                            <a:latin typeface="Cambria Math" panose="02040503050406030204" pitchFamily="18" charset="0"/>
+                          </a:rPr>
+                          <m:t>𝜎</m:t>
+                        </m:r>
+                        <m:rad>
+                          <m:radPr>
+                            <m:degHide m:val="on"/>
+                            <m:ctrlPr>
+                              <a:rPr lang="en-US" b="0" i="1" smtClean="0">
+                                <a:latin typeface="Cambria Math" panose="02040503050406030204" pitchFamily="18" charset="0"/>
+                              </a:rPr>
+                            </m:ctrlPr>
+                          </m:radPr>
+                          <m:deg/>
+                          <m:e>
+                            <m:r>
+                              <a:rPr lang="en-US" b="0" i="1" smtClean="0">
+                                <a:latin typeface="Cambria Math" panose="02040503050406030204" pitchFamily="18" charset="0"/>
+                              </a:rPr>
+                              <m:t>𝐿𝑇</m:t>
+                            </m:r>
+                          </m:e>
+                        </m:rad>
+                      </m:den>
+                    </m:f>
+                    <m:r>
+                      <a:rPr lang="en-US" b="0" i="1" smtClean="0">
+                        <a:latin typeface="Cambria Math" panose="02040503050406030204" pitchFamily="18" charset="0"/>
+                      </a:rPr>
+                      <m:t>=</m:t>
+                    </m:r>
+                    <m:r>
+                      <a:rPr lang="en-US" b="0" i="1" smtClean="0">
+                        <a:latin typeface="Cambria Math" panose="02040503050406030204" pitchFamily="18" charset="0"/>
+                      </a:rPr>
+                      <m:t>𝑧</m:t>
+                    </m:r>
+                  </m:oMath>
+                </a14:m>
+                <a:endParaRPr lang="en-US" b="0" dirty="0"/>
+              </a:p>
+              <a:p>
+                <a14:m>
+                  <m:oMath xmlns:m="http://schemas.openxmlformats.org/officeDocument/2006/math">
+                    <m:r>
+                      <a:rPr lang="en-US" b="1" i="1" smtClean="0">
+                        <a:solidFill>
+                          <a:schemeClr val="accent2"/>
+                        </a:solidFill>
+                        <a:latin typeface="Cambria Math" panose="02040503050406030204" pitchFamily="18" charset="0"/>
+                      </a:rPr>
+                      <m:t>𝒔</m:t>
+                    </m:r>
+                    <m:r>
+                      <a:rPr lang="en-US" b="1" i="1" smtClean="0">
+                        <a:solidFill>
+                          <a:schemeClr val="accent2"/>
+                        </a:solidFill>
+                        <a:latin typeface="Cambria Math" panose="02040503050406030204" pitchFamily="18" charset="0"/>
+                      </a:rPr>
+                      <m:t>=</m:t>
+                    </m:r>
+                    <m:r>
+                      <a:rPr lang="en-US" b="1" i="1" smtClean="0">
+                        <a:solidFill>
+                          <a:schemeClr val="accent2"/>
+                        </a:solidFill>
+                        <a:latin typeface="Cambria Math" panose="02040503050406030204" pitchFamily="18" charset="0"/>
+                      </a:rPr>
+                      <m:t>𝒛</m:t>
+                    </m:r>
+                    <m:r>
+                      <a:rPr lang="en-US" b="1" i="1" smtClean="0">
+                        <a:solidFill>
+                          <a:schemeClr val="accent2"/>
+                        </a:solidFill>
+                        <a:latin typeface="Cambria Math" panose="02040503050406030204" pitchFamily="18" charset="0"/>
+                      </a:rPr>
+                      <m:t>𝝈</m:t>
+                    </m:r>
+                    <m:rad>
+                      <m:radPr>
+                        <m:degHide m:val="on"/>
+                        <m:ctrlPr>
+                          <a:rPr lang="en-US" b="1" i="1" smtClean="0">
+                            <a:solidFill>
+                              <a:schemeClr val="accent2"/>
+                            </a:solidFill>
+                            <a:latin typeface="Cambria Math" panose="02040503050406030204" pitchFamily="18" charset="0"/>
+                          </a:rPr>
+                        </m:ctrlPr>
+                      </m:radPr>
+                      <m:deg/>
+                      <m:e>
+                        <m:r>
+                          <a:rPr lang="en-US" b="1" i="1" smtClean="0">
+                            <a:solidFill>
+                              <a:schemeClr val="accent2"/>
+                            </a:solidFill>
+                            <a:latin typeface="Cambria Math" panose="02040503050406030204" pitchFamily="18" charset="0"/>
+                          </a:rPr>
+                          <m:t>𝑳𝑻</m:t>
+                        </m:r>
+                      </m:e>
+                    </m:rad>
+                  </m:oMath>
+                </a14:m>
+                <a:endParaRPr lang="en-US" b="1" dirty="0">
+                  <a:solidFill>
+                    <a:schemeClr val="accent2"/>
+                  </a:solidFill>
+                </a:endParaRPr>
+              </a:p>
+              <a:p>
+                <a:r>
+                  <a:rPr lang="en-US" dirty="0"/>
+                  <a:t>Para um </a:t>
+                </a:r>
+                <a:r>
+                  <a:rPr lang="en-US" dirty="0" err="1"/>
+                  <a:t>risco</a:t>
+                </a:r>
+                <a:r>
+                  <a:rPr lang="en-US" dirty="0"/>
+                  <a:t> de </a:t>
+                </a:r>
+                <a:r>
+                  <a:rPr lang="en-US" dirty="0" err="1"/>
+                  <a:t>falta</a:t>
+                </a:r>
+                <a:r>
+                  <a:rPr lang="en-US" dirty="0"/>
+                  <a:t> de </a:t>
+                </a:r>
+                <a14:m>
+                  <m:oMath xmlns:m="http://schemas.openxmlformats.org/officeDocument/2006/math">
+                    <m:r>
+                      <a:rPr lang="en-US" b="0" i="1" smtClean="0">
+                        <a:latin typeface="Cambria Math" panose="02040503050406030204" pitchFamily="18" charset="0"/>
+                      </a:rPr>
+                      <m:t>𝛼</m:t>
+                    </m:r>
+                    <m:r>
+                      <a:rPr lang="en-US" b="0" i="1" smtClean="0">
+                        <a:latin typeface="Cambria Math" panose="02040503050406030204" pitchFamily="18" charset="0"/>
+                      </a:rPr>
+                      <m:t>=5%</m:t>
+                    </m:r>
+                  </m:oMath>
+                </a14:m>
+                <a:r>
+                  <a:rPr lang="en-US" b="0" dirty="0"/>
+                  <a:t>, </a:t>
+                </a:r>
+                <a14:m>
+                  <m:oMath xmlns:m="http://schemas.openxmlformats.org/officeDocument/2006/math">
+                    <m:r>
+                      <a:rPr lang="en-US" b="0" i="1" dirty="0" smtClean="0">
+                        <a:latin typeface="Cambria Math" panose="02040503050406030204" pitchFamily="18" charset="0"/>
+                      </a:rPr>
+                      <m:t>𝑧</m:t>
+                    </m:r>
+                    <m:r>
+                      <a:rPr lang="en-US" b="0" i="1" dirty="0" smtClean="0">
+                        <a:latin typeface="Cambria Math" panose="02040503050406030204" pitchFamily="18" charset="0"/>
+                      </a:rPr>
+                      <m:t>=1,64</m:t>
+                    </m:r>
+                  </m:oMath>
+                </a14:m>
+                <a:endParaRPr lang="en-US" b="0" dirty="0"/>
+              </a:p>
+              <a:p>
+                <a:r>
+                  <a:rPr lang="en-US" dirty="0">
+                    <a:solidFill>
+                      <a:schemeClr val="accent2"/>
+                    </a:solidFill>
+                  </a:rPr>
+                  <a:t>O estoque de </a:t>
+                </a:r>
+                <a:r>
+                  <a:rPr lang="en-US" dirty="0" err="1">
+                    <a:solidFill>
+                      <a:schemeClr val="accent2"/>
+                    </a:solidFill>
+                  </a:rPr>
+                  <a:t>seguran</a:t>
+                </a:r>
+                <a:r>
+                  <a:rPr lang="pt-BR" dirty="0">
+                    <a:solidFill>
+                      <a:schemeClr val="accent2"/>
+                    </a:solidFill>
+                  </a:rPr>
+                  <a:t>ça aumenta com a raiz quadrada do tempo de ressuprimento.</a:t>
+                </a:r>
+                <a:endParaRPr lang="en-US" b="0" dirty="0">
+                  <a:solidFill>
+                    <a:schemeClr val="accent2"/>
+                  </a:solidFill>
+                </a:endParaRPr>
+              </a:p>
+            </p:txBody>
+          </p:sp>
+        </mc:Choice>
+        <mc:Fallback>
+          <p:sp>
+            <p:nvSpPr>
+              <p:cNvPr id="5" name="Content Placeholder 4">
+                <a:extLst>
+                  <a:ext uri="{FF2B5EF4-FFF2-40B4-BE49-F238E27FC236}">
+                    <a16:creationId xmlns:a16="http://schemas.microsoft.com/office/drawing/2014/main" id="{9D48A1B6-4C2B-45F2-9CD1-4B6816EFD7A2}"/>
+                  </a:ext>
+                </a:extLst>
+              </p:cNvPr>
+              <p:cNvSpPr>
+                <a:spLocks noGrp="1" noRot="1" noChangeAspect="1" noMove="1" noResize="1" noEditPoints="1" noAdjustHandles="1" noChangeArrowheads="1" noChangeShapeType="1" noTextEdit="1"/>
+              </p:cNvSpPr>
+              <p:nvPr>
+                <p:ph sz="half" idx="2"/>
+              </p:nvPr>
+            </p:nvSpPr>
+            <p:spPr>
+              <a:xfrm>
+                <a:off x="5989319" y="2286000"/>
+                <a:ext cx="6202681" cy="4267200"/>
+              </a:xfrm>
+              <a:blipFill>
+                <a:blip r:embed="rId2"/>
+                <a:stretch>
+                  <a:fillRect l="-982" r="-589"/>
+                </a:stretch>
+              </a:blipFill>
+            </p:spPr>
+            <p:txBody>
+              <a:bodyPr/>
+              <a:lstStyle/>
+              <a:p>
+                <a:r>
+                  <a:rPr lang="en-US">
+                    <a:noFill/>
+                  </a:rPr>
+                  <a:t> </a:t>
+                </a:r>
+              </a:p>
+            </p:txBody>
+          </p:sp>
+        </mc:Fallback>
+      </mc:AlternateContent>
+      <p:pic>
+        <p:nvPicPr>
+          <p:cNvPr id="1026" name="Picture 2" descr="See the source image">
+            <a:extLst>
+              <a:ext uri="{FF2B5EF4-FFF2-40B4-BE49-F238E27FC236}">
+                <a16:creationId xmlns:a16="http://schemas.microsoft.com/office/drawing/2014/main" id="{3A0B1B6D-7122-439F-9E4D-68F36FF0716F}"/>
+              </a:ext>
+            </a:extLst>
+          </p:cNvPr>
+          <p:cNvPicPr>
+            <a:picLocks noChangeAspect="1" noChangeArrowheads="1"/>
+          </p:cNvPicPr>
+          <p:nvPr/>
+        </p:nvPicPr>
+        <p:blipFill>
+          <a:blip r:embed="rId3">
+            <a:extLst>
+              <a:ext uri="{28A0092B-C50C-407E-A947-70E740481C1C}">
+                <a14:useLocalDpi xmlns:a14="http://schemas.microsoft.com/office/drawing/2010/main" val="0"/>
+              </a:ext>
+            </a:extLst>
+          </a:blip>
+          <a:srcRect/>
+          <a:stretch>
+            <a:fillRect/>
+          </a:stretch>
+        </p:blipFill>
+        <p:spPr bwMode="auto">
+          <a:xfrm>
+            <a:off x="1024128" y="2694305"/>
+            <a:ext cx="4762500" cy="2381250"/>
+          </a:xfrm>
+          <a:prstGeom prst="rect">
+            <a:avLst/>
+          </a:prstGeom>
+          <a:ln>
+            <a:noFill/>
+          </a:ln>
+          <a:effectLst>
+            <a:outerShdw blurRad="292100" dist="139700" dir="2700000" algn="tl" rotWithShape="0">
+              <a:srgbClr val="333333">
+                <a:alpha val="65000"/>
+              </a:srgbClr>
+            </a:outerShdw>
+          </a:effectLst>
+          <a:extLst>
+            <a:ext uri="{909E8E84-426E-40DD-AFC4-6F175D3DCCD1}">
+              <a14:hiddenFill xmlns:a14="http://schemas.microsoft.com/office/drawing/2010/main">
+                <a:solidFill>
+                  <a:srgbClr val="FFFFFF"/>
+                </a:solidFill>
+              </a14:hiddenFill>
+            </a:ext>
+          </a:extLst>
+        </p:spPr>
+      </p:pic>
+    </p:spTree>
+    <p:extLst>
+      <p:ext uri="{BB962C8B-B14F-4D97-AF65-F5344CB8AC3E}">
+        <p14:creationId xmlns:p14="http://schemas.microsoft.com/office/powerpoint/2010/main" val="3286444841"/>
+      </p:ext>
+    </p:extLst>
+  </p:cSld>
+  <p:clrMapOvr>
+    <a:masterClrMapping/>
+  </p:clrMapOvr>
+</p:sld>
+</file>
+
+<file path=ppt/slides/slide32.xml><?xml version="1.0" encoding="utf-8"?>
 <p:sld xmlns:a="http://schemas.openxmlformats.org/drawingml/2006/main" xmlns:r="http://schemas.openxmlformats.org/officeDocument/2006/relationships" xmlns:p="http://schemas.openxmlformats.org/presentationml/2006/main">
   <p:cSld>
     <p:bg>

</xml_diff>